<commit_message>
Fixed a minor grammatical error
</commit_message>
<xml_diff>
--- a/DISA.pptx
+++ b/DISA.pptx
@@ -6212,8 +6212,12 @@
           <a:lstStyle/>
           <a:p>
             <a:r>
+              <a:rPr lang="en-US" smtClean="0"/>
+              <a:t>At </a:t>
+            </a:r>
+            <a:r>
               <a:rPr lang="en-US" dirty="0" smtClean="0"/>
-              <a:t>AT the end of project.</a:t>
+              <a:t>the end of project.</a:t>
             </a:r>
             <a:endParaRPr lang="en-US" dirty="0"/>
           </a:p>

</xml_diff>